<commit_message>
udpated ppt for data processing
</commit_message>
<xml_diff>
--- a/PPT/Apache_Flink.pptx
+++ b/PPT/Apache_Flink.pptx
@@ -6,9 +6,13 @@
   </p:sldMasterIdLst>
   <p:sldIdLst>
     <p:sldId id="256" r:id="rId2"/>
-    <p:sldId id="257" r:id="rId3"/>
-    <p:sldId id="258" r:id="rId4"/>
-    <p:sldId id="259" r:id="rId5"/>
+    <p:sldId id="260" r:id="rId3"/>
+    <p:sldId id="261" r:id="rId4"/>
+    <p:sldId id="262" r:id="rId5"/>
+    <p:sldId id="263" r:id="rId6"/>
+    <p:sldId id="257" r:id="rId7"/>
+    <p:sldId id="258" r:id="rId8"/>
+    <p:sldId id="259" r:id="rId9"/>
   </p:sldIdLst>
   <p:sldSz cx="12192000" cy="6858000"/>
   <p:notesSz cx="6858000" cy="9144000"/>
@@ -107,6 +111,11 @@
       </a:defRPr>
     </a:lvl9pPr>
   </p:defaultTextStyle>
+  <p:extLst>
+    <p:ext uri="{EFAFB233-063F-42B5-8137-9DF3F51BA10A}">
+      <p15:sldGuideLst xmlns:p15="http://schemas.microsoft.com/office/powerpoint/2012/main"/>
+    </p:ext>
+  </p:extLst>
 </p:presentation>
 </file>
 
@@ -259,7 +268,7 @@
           <a:p>
             <a:fld id="{A25B66AA-0EED-4F9A-AD8D-5AE32534EE6F}" type="datetimeFigureOut">
               <a:rPr lang="en-IN" smtClean="0"/>
-              <a:t>03-03-2024</a:t>
+              <a:t>27-03-2024</a:t>
             </a:fld>
             <a:endParaRPr lang="en-IN"/>
           </a:p>
@@ -459,7 +468,7 @@
           <a:p>
             <a:fld id="{A25B66AA-0EED-4F9A-AD8D-5AE32534EE6F}" type="datetimeFigureOut">
               <a:rPr lang="en-IN" smtClean="0"/>
-              <a:t>03-03-2024</a:t>
+              <a:t>27-03-2024</a:t>
             </a:fld>
             <a:endParaRPr lang="en-IN"/>
           </a:p>
@@ -669,7 +678,7 @@
           <a:p>
             <a:fld id="{A25B66AA-0EED-4F9A-AD8D-5AE32534EE6F}" type="datetimeFigureOut">
               <a:rPr lang="en-IN" smtClean="0"/>
-              <a:t>03-03-2024</a:t>
+              <a:t>27-03-2024</a:t>
             </a:fld>
             <a:endParaRPr lang="en-IN"/>
           </a:p>
@@ -869,7 +878,7 @@
           <a:p>
             <a:fld id="{A25B66AA-0EED-4F9A-AD8D-5AE32534EE6F}" type="datetimeFigureOut">
               <a:rPr lang="en-IN" smtClean="0"/>
-              <a:t>03-03-2024</a:t>
+              <a:t>27-03-2024</a:t>
             </a:fld>
             <a:endParaRPr lang="en-IN"/>
           </a:p>
@@ -1145,7 +1154,7 @@
           <a:p>
             <a:fld id="{A25B66AA-0EED-4F9A-AD8D-5AE32534EE6F}" type="datetimeFigureOut">
               <a:rPr lang="en-IN" smtClean="0"/>
-              <a:t>03-03-2024</a:t>
+              <a:t>27-03-2024</a:t>
             </a:fld>
             <a:endParaRPr lang="en-IN"/>
           </a:p>
@@ -1413,7 +1422,7 @@
           <a:p>
             <a:fld id="{A25B66AA-0EED-4F9A-AD8D-5AE32534EE6F}" type="datetimeFigureOut">
               <a:rPr lang="en-IN" smtClean="0"/>
-              <a:t>03-03-2024</a:t>
+              <a:t>27-03-2024</a:t>
             </a:fld>
             <a:endParaRPr lang="en-IN"/>
           </a:p>
@@ -1828,7 +1837,7 @@
           <a:p>
             <a:fld id="{A25B66AA-0EED-4F9A-AD8D-5AE32534EE6F}" type="datetimeFigureOut">
               <a:rPr lang="en-IN" smtClean="0"/>
-              <a:t>03-03-2024</a:t>
+              <a:t>27-03-2024</a:t>
             </a:fld>
             <a:endParaRPr lang="en-IN"/>
           </a:p>
@@ -1970,7 +1979,7 @@
           <a:p>
             <a:fld id="{A25B66AA-0EED-4F9A-AD8D-5AE32534EE6F}" type="datetimeFigureOut">
               <a:rPr lang="en-IN" smtClean="0"/>
-              <a:t>03-03-2024</a:t>
+              <a:t>27-03-2024</a:t>
             </a:fld>
             <a:endParaRPr lang="en-IN"/>
           </a:p>
@@ -2083,7 +2092,7 @@
           <a:p>
             <a:fld id="{A25B66AA-0EED-4F9A-AD8D-5AE32534EE6F}" type="datetimeFigureOut">
               <a:rPr lang="en-IN" smtClean="0"/>
-              <a:t>03-03-2024</a:t>
+              <a:t>27-03-2024</a:t>
             </a:fld>
             <a:endParaRPr lang="en-IN"/>
           </a:p>
@@ -2396,7 +2405,7 @@
           <a:p>
             <a:fld id="{A25B66AA-0EED-4F9A-AD8D-5AE32534EE6F}" type="datetimeFigureOut">
               <a:rPr lang="en-IN" smtClean="0"/>
-              <a:t>03-03-2024</a:t>
+              <a:t>27-03-2024</a:t>
             </a:fld>
             <a:endParaRPr lang="en-IN"/>
           </a:p>
@@ -2685,7 +2694,7 @@
           <a:p>
             <a:fld id="{A25B66AA-0EED-4F9A-AD8D-5AE32534EE6F}" type="datetimeFigureOut">
               <a:rPr lang="en-IN" smtClean="0"/>
-              <a:t>03-03-2024</a:t>
+              <a:t>27-03-2024</a:t>
             </a:fld>
             <a:endParaRPr lang="en-IN"/>
           </a:p>
@@ -2928,7 +2937,7 @@
           <a:p>
             <a:fld id="{A25B66AA-0EED-4F9A-AD8D-5AE32534EE6F}" type="datetimeFigureOut">
               <a:rPr lang="en-IN" smtClean="0"/>
-              <a:t>03-03-2024</a:t>
+              <a:t>27-03-2024</a:t>
             </a:fld>
             <a:endParaRPr lang="en-IN"/>
           </a:p>
@@ -10424,12 +10433,12 @@
           <a:lstStyle/>
           <a:p>
             <a:r>
-              <a:rPr lang="en-IN" sz="5200">
+              <a:rPr lang="en-IN" sz="5200" dirty="0">
                 <a:solidFill>
                   <a:schemeClr val="tx2"/>
                 </a:solidFill>
               </a:rPr>
-              <a:t>Apache Flink</a:t>
+              <a:t>Data Processing</a:t>
             </a:r>
           </a:p>
         </p:txBody>
@@ -10463,13 +10472,26 @@
           <a:lstStyle/>
           <a:p>
             <a:r>
-              <a:rPr lang="en-IN">
+              <a:rPr lang="en-IN" dirty="0">
                 <a:solidFill>
                   <a:schemeClr val="tx2"/>
                 </a:solidFill>
               </a:rPr>
-              <a:t>The Stream Processor</a:t>
+              <a:t>Apache </a:t>
             </a:r>
+            <a:r>
+              <a:rPr lang="en-IN" dirty="0" err="1">
+                <a:solidFill>
+                  <a:schemeClr val="tx2"/>
+                </a:solidFill>
+              </a:rPr>
+              <a:t>Flink</a:t>
+            </a:r>
+            <a:endParaRPr lang="en-IN" dirty="0">
+              <a:solidFill>
+                <a:schemeClr val="tx2"/>
+              </a:solidFill>
+            </a:endParaRPr>
           </a:p>
         </p:txBody>
       </p:sp>
@@ -10487,6 +10509,1924 @@
 </file>
 
 <file path=ppt/slides/slide2.xml><?xml version="1.0" encoding="utf-8"?>
+<p:sld xmlns:a="http://schemas.openxmlformats.org/drawingml/2006/main" xmlns:r="http://schemas.openxmlformats.org/officeDocument/2006/relationships" xmlns:p="http://schemas.openxmlformats.org/presentationml/2006/main">
+  <p:cSld>
+    <p:spTree>
+      <p:nvGrpSpPr>
+        <p:cNvPr id="1" name=""/>
+        <p:cNvGrpSpPr/>
+        <p:nvPr/>
+      </p:nvGrpSpPr>
+      <p:grpSpPr>
+        <a:xfrm>
+          <a:off x="0" y="0"/>
+          <a:ext cx="0" cy="0"/>
+          <a:chOff x="0" y="0"/>
+          <a:chExt cx="0" cy="0"/>
+        </a:xfrm>
+      </p:grpSpPr>
+      <p:sp>
+        <p:nvSpPr>
+          <p:cNvPr id="2" name="Title 1">
+            <a:extLst>
+              <a:ext uri="{FF2B5EF4-FFF2-40B4-BE49-F238E27FC236}">
+                <a16:creationId xmlns:a16="http://schemas.microsoft.com/office/drawing/2014/main" id="{D79012B1-B2E8-63B0-38F7-2BCB1BCAEDF9}"/>
+              </a:ext>
+            </a:extLst>
+          </p:cNvPr>
+          <p:cNvSpPr>
+            <a:spLocks noGrp="1"/>
+          </p:cNvSpPr>
+          <p:nvPr>
+            <p:ph type="title"/>
+          </p:nvPr>
+        </p:nvSpPr>
+        <p:spPr/>
+        <p:txBody>
+          <a:bodyPr/>
+          <a:lstStyle/>
+          <a:p>
+            <a:r>
+              <a:rPr lang="en-IN" dirty="0"/>
+              <a:t>What - Data Processing/Management</a:t>
+            </a:r>
+          </a:p>
+        </p:txBody>
+      </p:sp>
+      <p:sp>
+        <p:nvSpPr>
+          <p:cNvPr id="3" name="Content Placeholder 2">
+            <a:extLst>
+              <a:ext uri="{FF2B5EF4-FFF2-40B4-BE49-F238E27FC236}">
+                <a16:creationId xmlns:a16="http://schemas.microsoft.com/office/drawing/2014/main" id="{E60BF137-50BE-3204-6808-B92804FF77CB}"/>
+              </a:ext>
+            </a:extLst>
+          </p:cNvPr>
+          <p:cNvSpPr>
+            <a:spLocks noGrp="1"/>
+          </p:cNvSpPr>
+          <p:nvPr>
+            <p:ph idx="1"/>
+          </p:nvPr>
+        </p:nvSpPr>
+        <p:spPr/>
+        <p:txBody>
+          <a:bodyPr>
+            <a:normAutofit lnSpcReduction="10000"/>
+          </a:bodyPr>
+          <a:lstStyle/>
+          <a:p>
+            <a:r>
+              <a:rPr lang="en-IN" sz="2400" dirty="0"/>
+              <a:t>Manipulation and transformation of raw data into meaningful insights or information.</a:t>
+            </a:r>
+          </a:p>
+          <a:p>
+            <a:endParaRPr lang="en-IN" sz="2400" dirty="0"/>
+          </a:p>
+          <a:p>
+            <a:r>
+              <a:rPr lang="en-IN" sz="2400" b="0" i="0" dirty="0">
+                <a:solidFill>
+                  <a:srgbClr val="0D0D0D"/>
+                </a:solidFill>
+                <a:effectLst/>
+                <a:latin typeface="Söhne"/>
+              </a:rPr>
+              <a:t>Involves various operations like filtering, aggregating, transforming, and analysing data.</a:t>
+            </a:r>
+          </a:p>
+          <a:p>
+            <a:endParaRPr lang="en-IN" sz="2400" b="0" i="0" dirty="0">
+              <a:solidFill>
+                <a:srgbClr val="0D0D0D"/>
+              </a:solidFill>
+              <a:effectLst/>
+              <a:latin typeface="Söhne"/>
+            </a:endParaRPr>
+          </a:p>
+          <a:p>
+            <a:r>
+              <a:rPr lang="en-IN" sz="2400" b="0" i="0" dirty="0">
+                <a:solidFill>
+                  <a:srgbClr val="0D0D0D"/>
+                </a:solidFill>
+                <a:effectLst/>
+                <a:latin typeface="Söhne"/>
+              </a:rPr>
+              <a:t>Essential for extracting value from large volumes of data generated by modern applications and systems.</a:t>
+            </a:r>
+          </a:p>
+          <a:p>
+            <a:endParaRPr lang="en-IN" sz="2400" b="0" i="0" dirty="0">
+              <a:solidFill>
+                <a:srgbClr val="0D0D0D"/>
+              </a:solidFill>
+              <a:effectLst/>
+              <a:latin typeface="Söhne"/>
+            </a:endParaRPr>
+          </a:p>
+          <a:p>
+            <a:r>
+              <a:rPr lang="en-IN" sz="2400" dirty="0">
+                <a:solidFill>
+                  <a:srgbClr val="0D0D0D"/>
+                </a:solidFill>
+                <a:latin typeface="Söhne"/>
+              </a:rPr>
+              <a:t>Provides the framework for turning raw data into actionable information, empowering organizations to drive efficiency, innovation, and competitiveness.</a:t>
+            </a:r>
+          </a:p>
+        </p:txBody>
+      </p:sp>
+    </p:spTree>
+    <p:extLst>
+      <p:ext uri="{BB962C8B-B14F-4D97-AF65-F5344CB8AC3E}">
+        <p14:creationId xmlns:p14="http://schemas.microsoft.com/office/powerpoint/2010/main" val="1317715835"/>
+      </p:ext>
+    </p:extLst>
+  </p:cSld>
+  <p:clrMapOvr>
+    <a:masterClrMapping/>
+  </p:clrMapOvr>
+</p:sld>
+</file>
+
+<file path=ppt/slides/slide3.xml><?xml version="1.0" encoding="utf-8"?>
+<p:sld xmlns:a="http://schemas.openxmlformats.org/drawingml/2006/main" xmlns:r="http://schemas.openxmlformats.org/officeDocument/2006/relationships" xmlns:p="http://schemas.openxmlformats.org/presentationml/2006/main">
+  <p:cSld>
+    <p:spTree>
+      <p:nvGrpSpPr>
+        <p:cNvPr id="1" name=""/>
+        <p:cNvGrpSpPr/>
+        <p:nvPr/>
+      </p:nvGrpSpPr>
+      <p:grpSpPr>
+        <a:xfrm>
+          <a:off x="0" y="0"/>
+          <a:ext cx="0" cy="0"/>
+          <a:chOff x="0" y="0"/>
+          <a:chExt cx="0" cy="0"/>
+        </a:xfrm>
+      </p:grpSpPr>
+      <p:sp>
+        <p:nvSpPr>
+          <p:cNvPr id="2" name="Title 1">
+            <a:extLst>
+              <a:ext uri="{FF2B5EF4-FFF2-40B4-BE49-F238E27FC236}">
+                <a16:creationId xmlns:a16="http://schemas.microsoft.com/office/drawing/2014/main" id="{D79012B1-B2E8-63B0-38F7-2BCB1BCAEDF9}"/>
+              </a:ext>
+            </a:extLst>
+          </p:cNvPr>
+          <p:cNvSpPr>
+            <a:spLocks noGrp="1"/>
+          </p:cNvSpPr>
+          <p:nvPr>
+            <p:ph type="title"/>
+          </p:nvPr>
+        </p:nvSpPr>
+        <p:spPr/>
+        <p:txBody>
+          <a:bodyPr/>
+          <a:lstStyle/>
+          <a:p>
+            <a:r>
+              <a:rPr lang="en-IN" dirty="0"/>
+              <a:t>Why - Data Processing</a:t>
+            </a:r>
+          </a:p>
+        </p:txBody>
+      </p:sp>
+      <p:sp>
+        <p:nvSpPr>
+          <p:cNvPr id="3" name="Content Placeholder 2">
+            <a:extLst>
+              <a:ext uri="{FF2B5EF4-FFF2-40B4-BE49-F238E27FC236}">
+                <a16:creationId xmlns:a16="http://schemas.microsoft.com/office/drawing/2014/main" id="{E60BF137-50BE-3204-6808-B92804FF77CB}"/>
+              </a:ext>
+            </a:extLst>
+          </p:cNvPr>
+          <p:cNvSpPr>
+            <a:spLocks noGrp="1"/>
+          </p:cNvSpPr>
+          <p:nvPr>
+            <p:ph idx="1"/>
+          </p:nvPr>
+        </p:nvSpPr>
+        <p:spPr/>
+        <p:txBody>
+          <a:bodyPr>
+            <a:normAutofit/>
+          </a:bodyPr>
+          <a:lstStyle/>
+          <a:p>
+            <a:r>
+              <a:rPr lang="en-IN" sz="2400" dirty="0"/>
+              <a:t>Importance</a:t>
+            </a:r>
+          </a:p>
+          <a:p>
+            <a:pPr lvl="1"/>
+            <a:r>
+              <a:rPr lang="en-IN" sz="1600" dirty="0">
+                <a:solidFill>
+                  <a:srgbClr val="0D0D0D"/>
+                </a:solidFill>
+                <a:latin typeface="Söhne"/>
+              </a:rPr>
+              <a:t>Process data in real-time or near-real-time</a:t>
+            </a:r>
+          </a:p>
+          <a:p>
+            <a:pPr lvl="1"/>
+            <a:r>
+              <a:rPr lang="en-IN" sz="1600" b="0" i="0" dirty="0">
+                <a:solidFill>
+                  <a:srgbClr val="0D0D0D"/>
+                </a:solidFill>
+                <a:effectLst/>
+                <a:latin typeface="Söhne"/>
+              </a:rPr>
+              <a:t>Enables organizations to make data-driven decisions.</a:t>
+            </a:r>
+          </a:p>
+          <a:p>
+            <a:pPr lvl="1"/>
+            <a:r>
+              <a:rPr lang="en-IN" sz="1600" b="0" i="0" dirty="0">
+                <a:solidFill>
+                  <a:srgbClr val="0D0D0D"/>
+                </a:solidFill>
+                <a:effectLst/>
+                <a:latin typeface="Söhne"/>
+              </a:rPr>
+              <a:t>Improves efficiency and productivity by automating repetitive tasks.</a:t>
+            </a:r>
+          </a:p>
+          <a:p>
+            <a:pPr lvl="1"/>
+            <a:r>
+              <a:rPr lang="en-IN" sz="1600" b="0" i="0" dirty="0">
+                <a:solidFill>
+                  <a:srgbClr val="0D0D0D"/>
+                </a:solidFill>
+                <a:effectLst/>
+                <a:latin typeface="Söhne"/>
+              </a:rPr>
+              <a:t>Facilitates real-time insights and responses to changing conditions.</a:t>
+            </a:r>
+          </a:p>
+          <a:p>
+            <a:pPr lvl="1"/>
+            <a:r>
+              <a:rPr lang="en-IN" sz="1600" dirty="0">
+                <a:solidFill>
+                  <a:srgbClr val="0D0D0D"/>
+                </a:solidFill>
+                <a:latin typeface="Söhne"/>
+              </a:rPr>
+              <a:t>F</a:t>
+            </a:r>
+            <a:r>
+              <a:rPr lang="en-IN" sz="1600" b="0" i="0" dirty="0">
+                <a:solidFill>
+                  <a:srgbClr val="0D0D0D"/>
+                </a:solidFill>
+                <a:effectLst/>
+                <a:latin typeface="Söhne"/>
+              </a:rPr>
+              <a:t>oundation for various applications such as business intelligence, machine learning, and predictive analytics.</a:t>
+            </a:r>
+            <a:endParaRPr lang="en-IN" sz="2000" dirty="0"/>
+          </a:p>
+          <a:p>
+            <a:pPr lvl="1"/>
+            <a:endParaRPr lang="en-IN" sz="2000" dirty="0"/>
+          </a:p>
+          <a:p>
+            <a:r>
+              <a:rPr lang="en-IN" sz="2400" dirty="0"/>
+              <a:t>Challenges</a:t>
+            </a:r>
+          </a:p>
+          <a:p>
+            <a:pPr lvl="1"/>
+            <a:r>
+              <a:rPr lang="en-IN" sz="1600" b="0" i="0" dirty="0">
+                <a:solidFill>
+                  <a:srgbClr val="0D0D0D"/>
+                </a:solidFill>
+                <a:effectLst/>
+                <a:latin typeface="Söhne"/>
+              </a:rPr>
+              <a:t>Managing large volumes of data efficiently.</a:t>
+            </a:r>
+          </a:p>
+          <a:p>
+            <a:pPr lvl="1"/>
+            <a:r>
+              <a:rPr lang="en-IN" sz="1600" dirty="0">
+                <a:solidFill>
+                  <a:srgbClr val="0D0D0D"/>
+                </a:solidFill>
+                <a:latin typeface="Söhne"/>
+              </a:rPr>
+              <a:t>Requires robust infrastructure and algorithms capable of handling the complexities.</a:t>
+            </a:r>
+          </a:p>
+          <a:p>
+            <a:pPr lvl="1"/>
+            <a:r>
+              <a:rPr lang="en-IN" sz="1600" b="0" i="0" dirty="0">
+                <a:solidFill>
+                  <a:srgbClr val="0D0D0D"/>
+                </a:solidFill>
+                <a:effectLst/>
+                <a:latin typeface="Söhne"/>
+              </a:rPr>
+              <a:t>Ensuring data quality and reliability.</a:t>
+            </a:r>
+            <a:endParaRPr lang="en-IN" sz="1600" dirty="0">
+              <a:solidFill>
+                <a:srgbClr val="0D0D0D"/>
+              </a:solidFill>
+              <a:latin typeface="Söhne"/>
+            </a:endParaRPr>
+          </a:p>
+          <a:p>
+            <a:pPr lvl="1"/>
+            <a:r>
+              <a:rPr lang="en-IN" sz="1600" b="0" i="0" dirty="0">
+                <a:solidFill>
+                  <a:srgbClr val="0D0D0D"/>
+                </a:solidFill>
+                <a:effectLst/>
+                <a:latin typeface="Söhne"/>
+              </a:rPr>
+              <a:t>Handling diverse data formats and sources.</a:t>
+            </a:r>
+          </a:p>
+          <a:p>
+            <a:pPr lvl="1"/>
+            <a:r>
+              <a:rPr lang="en-IN" sz="1600" dirty="0">
+                <a:solidFill>
+                  <a:srgbClr val="0D0D0D"/>
+                </a:solidFill>
+                <a:latin typeface="Söhne"/>
+              </a:rPr>
+              <a:t>Data Volume and Velocity.</a:t>
+            </a:r>
+          </a:p>
+          <a:p>
+            <a:pPr lvl="1"/>
+            <a:endParaRPr lang="en-IN" sz="2000" dirty="0"/>
+          </a:p>
+        </p:txBody>
+      </p:sp>
+    </p:spTree>
+    <p:extLst>
+      <p:ext uri="{BB962C8B-B14F-4D97-AF65-F5344CB8AC3E}">
+        <p14:creationId xmlns:p14="http://schemas.microsoft.com/office/powerpoint/2010/main" val="1966180273"/>
+      </p:ext>
+    </p:extLst>
+  </p:cSld>
+  <p:clrMapOvr>
+    <a:masterClrMapping/>
+  </p:clrMapOvr>
+</p:sld>
+</file>
+
+<file path=ppt/slides/slide4.xml><?xml version="1.0" encoding="utf-8"?>
+<p:sld xmlns:a="http://schemas.openxmlformats.org/drawingml/2006/main" xmlns:r="http://schemas.openxmlformats.org/officeDocument/2006/relationships" xmlns:p="http://schemas.openxmlformats.org/presentationml/2006/main">
+  <p:cSld>
+    <p:spTree>
+      <p:nvGrpSpPr>
+        <p:cNvPr id="1" name=""/>
+        <p:cNvGrpSpPr/>
+        <p:nvPr/>
+      </p:nvGrpSpPr>
+      <p:grpSpPr>
+        <a:xfrm>
+          <a:off x="0" y="0"/>
+          <a:ext cx="0" cy="0"/>
+          <a:chOff x="0" y="0"/>
+          <a:chExt cx="0" cy="0"/>
+        </a:xfrm>
+      </p:grpSpPr>
+      <p:sp>
+        <p:nvSpPr>
+          <p:cNvPr id="2" name="Title 1">
+            <a:extLst>
+              <a:ext uri="{FF2B5EF4-FFF2-40B4-BE49-F238E27FC236}">
+                <a16:creationId xmlns:a16="http://schemas.microsoft.com/office/drawing/2014/main" id="{D79012B1-B2E8-63B0-38F7-2BCB1BCAEDF9}"/>
+              </a:ext>
+            </a:extLst>
+          </p:cNvPr>
+          <p:cNvSpPr>
+            <a:spLocks noGrp="1"/>
+          </p:cNvSpPr>
+          <p:nvPr>
+            <p:ph type="title"/>
+          </p:nvPr>
+        </p:nvSpPr>
+        <p:spPr/>
+        <p:txBody>
+          <a:bodyPr/>
+          <a:lstStyle/>
+          <a:p>
+            <a:r>
+              <a:rPr lang="en-IN" dirty="0"/>
+              <a:t>Open-Source Data Infrastructure</a:t>
+            </a:r>
+          </a:p>
+        </p:txBody>
+      </p:sp>
+      <p:graphicFrame>
+        <p:nvGraphicFramePr>
+          <p:cNvPr id="18" name="Content Placeholder 17">
+            <a:extLst>
+              <a:ext uri="{FF2B5EF4-FFF2-40B4-BE49-F238E27FC236}">
+                <a16:creationId xmlns:a16="http://schemas.microsoft.com/office/drawing/2014/main" id="{DF078084-F7C6-493F-C0FB-46A24FEC59B3}"/>
+              </a:ext>
+            </a:extLst>
+          </p:cNvPr>
+          <p:cNvGraphicFramePr>
+            <a:graphicFrameLocks noGrp="1"/>
+          </p:cNvGraphicFramePr>
+          <p:nvPr>
+            <p:ph idx="4294967295"/>
+            <p:extLst>
+              <p:ext uri="{D42A27DB-BD31-4B8C-83A1-F6EECF244321}">
+                <p14:modId xmlns:p14="http://schemas.microsoft.com/office/powerpoint/2010/main" val="890246229"/>
+              </p:ext>
+            </p:extLst>
+          </p:nvPr>
+        </p:nvGraphicFramePr>
+        <p:xfrm>
+          <a:off x="766916" y="1825625"/>
+          <a:ext cx="10894142" cy="4791911"/>
+        </p:xfrm>
+        <a:graphic>
+          <a:graphicData uri="http://schemas.openxmlformats.org/drawingml/2006/table">
+            <a:tbl>
+              <a:tblPr>
+                <a:tableStyleId>{2D5ABB26-0587-4C30-8999-92F81FD0307C}</a:tableStyleId>
+              </a:tblPr>
+              <a:tblGrid>
+                <a:gridCol w="2178828">
+                  <a:extLst>
+                    <a:ext uri="{9D8B030D-6E8A-4147-A177-3AD203B41FA5}">
+                      <a16:colId xmlns:a16="http://schemas.microsoft.com/office/drawing/2014/main" val="2400039317"/>
+                    </a:ext>
+                  </a:extLst>
+                </a:gridCol>
+                <a:gridCol w="8715314">
+                  <a:extLst>
+                    <a:ext uri="{9D8B030D-6E8A-4147-A177-3AD203B41FA5}">
+                      <a16:colId xmlns:a16="http://schemas.microsoft.com/office/drawing/2014/main" val="3435684873"/>
+                    </a:ext>
+                  </a:extLst>
+                </a:gridCol>
+              </a:tblGrid>
+              <a:tr h="877831">
+                <a:tc>
+                  <a:txBody>
+                    <a:bodyPr/>
+                    <a:lstStyle/>
+                    <a:p>
+                      <a:r>
+                        <a:rPr lang="en-IN" dirty="0"/>
+                        <a:t>Applications</a:t>
+                      </a:r>
+                    </a:p>
+                  </a:txBody>
+                  <a:tcPr anchor="ctr">
+                    <a:lnL w="12700" cap="flat" cmpd="sng" algn="ctr">
+                      <a:noFill/>
+                      <a:prstDash val="solid"/>
+                      <a:round/>
+                      <a:headEnd type="none" w="med" len="med"/>
+                      <a:tailEnd type="none" w="med" len="med"/>
+                    </a:lnL>
+                    <a:lnR w="12700" cap="flat" cmpd="sng" algn="ctr">
+                      <a:noFill/>
+                      <a:prstDash val="solid"/>
+                      <a:round/>
+                      <a:headEnd type="none" w="med" len="med"/>
+                      <a:tailEnd type="none" w="med" len="med"/>
+                    </a:lnR>
+                    <a:lnT w="12700" cap="flat" cmpd="sng" algn="ctr">
+                      <a:noFill/>
+                      <a:prstDash val="solid"/>
+                      <a:round/>
+                      <a:headEnd type="none" w="med" len="med"/>
+                      <a:tailEnd type="none" w="med" len="med"/>
+                    </a:lnT>
+                    <a:lnB w="12700" cap="flat" cmpd="sng" algn="ctr">
+                      <a:solidFill>
+                        <a:schemeClr val="tx1"/>
+                      </a:solidFill>
+                      <a:prstDash val="solid"/>
+                      <a:round/>
+                      <a:headEnd type="none" w="med" len="med"/>
+                      <a:tailEnd type="none" w="med" len="med"/>
+                    </a:lnB>
+                  </a:tcPr>
+                </a:tc>
+                <a:tc>
+                  <a:txBody>
+                    <a:bodyPr/>
+                    <a:lstStyle/>
+                    <a:p>
+                      <a:endParaRPr lang="en-IN" dirty="0"/>
+                    </a:p>
+                  </a:txBody>
+                  <a:tcPr>
+                    <a:lnL w="12700" cap="flat" cmpd="sng" algn="ctr">
+                      <a:noFill/>
+                      <a:prstDash val="solid"/>
+                      <a:round/>
+                      <a:headEnd type="none" w="med" len="med"/>
+                      <a:tailEnd type="none" w="med" len="med"/>
+                    </a:lnL>
+                    <a:lnR w="12700" cap="flat" cmpd="sng" algn="ctr">
+                      <a:noFill/>
+                      <a:prstDash val="solid"/>
+                      <a:round/>
+                      <a:headEnd type="none" w="med" len="med"/>
+                      <a:tailEnd type="none" w="med" len="med"/>
+                    </a:lnR>
+                    <a:lnT w="12700" cap="flat" cmpd="sng" algn="ctr">
+                      <a:noFill/>
+                      <a:prstDash val="solid"/>
+                      <a:round/>
+                      <a:headEnd type="none" w="med" len="med"/>
+                      <a:tailEnd type="none" w="med" len="med"/>
+                    </a:lnT>
+                    <a:lnB w="12700" cap="flat" cmpd="sng" algn="ctr">
+                      <a:solidFill>
+                        <a:schemeClr val="tx1"/>
+                      </a:solidFill>
+                      <a:prstDash val="solid"/>
+                      <a:round/>
+                      <a:headEnd type="none" w="med" len="med"/>
+                      <a:tailEnd type="none" w="med" len="med"/>
+                    </a:lnB>
+                  </a:tcPr>
+                </a:tc>
+                <a:extLst>
+                  <a:ext uri="{0D108BD9-81ED-4DB2-BD59-A6C34878D82A}">
+                    <a16:rowId xmlns:a16="http://schemas.microsoft.com/office/drawing/2014/main" val="1335246875"/>
+                  </a:ext>
+                </a:extLst>
+              </a:tr>
+              <a:tr h="1986531">
+                <a:tc>
+                  <a:txBody>
+                    <a:bodyPr/>
+                    <a:lstStyle/>
+                    <a:p>
+                      <a:r>
+                        <a:rPr lang="en-IN" dirty="0"/>
+                        <a:t>Data processing </a:t>
+                      </a:r>
+                    </a:p>
+                    <a:p>
+                      <a:r>
+                        <a:rPr lang="en-IN" dirty="0"/>
+                        <a:t>engines</a:t>
+                      </a:r>
+                    </a:p>
+                  </a:txBody>
+                  <a:tcPr anchor="ctr">
+                    <a:lnL w="12700" cap="flat" cmpd="sng" algn="ctr">
+                      <a:noFill/>
+                      <a:prstDash val="solid"/>
+                      <a:round/>
+                      <a:headEnd type="none" w="med" len="med"/>
+                      <a:tailEnd type="none" w="med" len="med"/>
+                    </a:lnL>
+                    <a:lnR w="12700" cap="flat" cmpd="sng" algn="ctr">
+                      <a:noFill/>
+                      <a:prstDash val="solid"/>
+                      <a:round/>
+                      <a:headEnd type="none" w="med" len="med"/>
+                      <a:tailEnd type="none" w="med" len="med"/>
+                    </a:lnR>
+                    <a:lnT w="12700" cap="flat" cmpd="sng" algn="ctr">
+                      <a:solidFill>
+                        <a:schemeClr val="tx1"/>
+                      </a:solidFill>
+                      <a:prstDash val="solid"/>
+                      <a:round/>
+                      <a:headEnd type="none" w="med" len="med"/>
+                      <a:tailEnd type="none" w="med" len="med"/>
+                    </a:lnT>
+                    <a:lnB w="12700" cap="flat" cmpd="sng" algn="ctr">
+                      <a:solidFill>
+                        <a:schemeClr val="tx1"/>
+                      </a:solidFill>
+                      <a:prstDash val="solid"/>
+                      <a:round/>
+                      <a:headEnd type="none" w="med" len="med"/>
+                      <a:tailEnd type="none" w="med" len="med"/>
+                    </a:lnB>
+                  </a:tcPr>
+                </a:tc>
+                <a:tc>
+                  <a:txBody>
+                    <a:bodyPr/>
+                    <a:lstStyle/>
+                    <a:p>
+                      <a:endParaRPr lang="en-IN" dirty="0"/>
+                    </a:p>
+                  </a:txBody>
+                  <a:tcPr>
+                    <a:lnL w="12700" cap="flat" cmpd="sng" algn="ctr">
+                      <a:noFill/>
+                      <a:prstDash val="solid"/>
+                      <a:round/>
+                      <a:headEnd type="none" w="med" len="med"/>
+                      <a:tailEnd type="none" w="med" len="med"/>
+                    </a:lnL>
+                    <a:lnR w="12700" cap="flat" cmpd="sng" algn="ctr">
+                      <a:noFill/>
+                      <a:prstDash val="solid"/>
+                      <a:round/>
+                      <a:headEnd type="none" w="med" len="med"/>
+                      <a:tailEnd type="none" w="med" len="med"/>
+                    </a:lnR>
+                    <a:lnT w="12700" cap="flat" cmpd="sng" algn="ctr">
+                      <a:solidFill>
+                        <a:schemeClr val="tx1"/>
+                      </a:solidFill>
+                      <a:prstDash val="solid"/>
+                      <a:round/>
+                      <a:headEnd type="none" w="med" len="med"/>
+                      <a:tailEnd type="none" w="med" len="med"/>
+                    </a:lnT>
+                    <a:lnB w="12700" cap="flat" cmpd="sng" algn="ctr">
+                      <a:solidFill>
+                        <a:schemeClr val="tx1"/>
+                      </a:solidFill>
+                      <a:prstDash val="solid"/>
+                      <a:round/>
+                      <a:headEnd type="none" w="med" len="med"/>
+                      <a:tailEnd type="none" w="med" len="med"/>
+                    </a:lnB>
+                    <a:lnTlToBr w="12700" cmpd="sng">
+                      <a:noFill/>
+                      <a:prstDash val="solid"/>
+                    </a:lnTlToBr>
+                    <a:lnBlToTr w="12700" cmpd="sng">
+                      <a:noFill/>
+                      <a:prstDash val="solid"/>
+                    </a:lnBlToTr>
+                  </a:tcPr>
+                </a:tc>
+                <a:extLst>
+                  <a:ext uri="{0D108BD9-81ED-4DB2-BD59-A6C34878D82A}">
+                    <a16:rowId xmlns:a16="http://schemas.microsoft.com/office/drawing/2014/main" val="2646218670"/>
+                  </a:ext>
+                </a:extLst>
+              </a:tr>
+              <a:tr h="904567">
+                <a:tc>
+                  <a:txBody>
+                    <a:bodyPr/>
+                    <a:lstStyle/>
+                    <a:p>
+                      <a:r>
+                        <a:rPr lang="en-IN" dirty="0"/>
+                        <a:t>App and resource </a:t>
+                      </a:r>
+                    </a:p>
+                    <a:p>
+                      <a:r>
+                        <a:rPr lang="en-IN" dirty="0"/>
+                        <a:t>management</a:t>
+                      </a:r>
+                    </a:p>
+                  </a:txBody>
+                  <a:tcPr anchor="ctr">
+                    <a:lnL w="12700" cap="flat" cmpd="sng" algn="ctr">
+                      <a:noFill/>
+                      <a:prstDash val="solid"/>
+                      <a:round/>
+                      <a:headEnd type="none" w="med" len="med"/>
+                      <a:tailEnd type="none" w="med" len="med"/>
+                    </a:lnL>
+                    <a:lnR w="12700" cap="flat" cmpd="sng" algn="ctr">
+                      <a:noFill/>
+                      <a:prstDash val="solid"/>
+                      <a:round/>
+                      <a:headEnd type="none" w="med" len="med"/>
+                      <a:tailEnd type="none" w="med" len="med"/>
+                    </a:lnR>
+                    <a:lnT w="12700" cap="flat" cmpd="sng" algn="ctr">
+                      <a:solidFill>
+                        <a:schemeClr val="tx1"/>
+                      </a:solidFill>
+                      <a:prstDash val="solid"/>
+                      <a:round/>
+                      <a:headEnd type="none" w="med" len="med"/>
+                      <a:tailEnd type="none" w="med" len="med"/>
+                    </a:lnT>
+                    <a:lnB w="12700" cap="flat" cmpd="sng" algn="ctr">
+                      <a:solidFill>
+                        <a:schemeClr val="tx1"/>
+                      </a:solidFill>
+                      <a:prstDash val="solid"/>
+                      <a:round/>
+                      <a:headEnd type="none" w="med" len="med"/>
+                      <a:tailEnd type="none" w="med" len="med"/>
+                    </a:lnB>
+                  </a:tcPr>
+                </a:tc>
+                <a:tc>
+                  <a:txBody>
+                    <a:bodyPr/>
+                    <a:lstStyle/>
+                    <a:p>
+                      <a:endParaRPr lang="en-IN" dirty="0"/>
+                    </a:p>
+                  </a:txBody>
+                  <a:tcPr>
+                    <a:lnL w="12700" cap="flat" cmpd="sng" algn="ctr">
+                      <a:noFill/>
+                      <a:prstDash val="solid"/>
+                      <a:round/>
+                      <a:headEnd type="none" w="med" len="med"/>
+                      <a:tailEnd type="none" w="med" len="med"/>
+                    </a:lnL>
+                    <a:lnR w="12700" cap="flat" cmpd="sng" algn="ctr">
+                      <a:noFill/>
+                      <a:prstDash val="solid"/>
+                      <a:round/>
+                      <a:headEnd type="none" w="med" len="med"/>
+                      <a:tailEnd type="none" w="med" len="med"/>
+                    </a:lnR>
+                    <a:lnT w="12700" cap="flat" cmpd="sng" algn="ctr">
+                      <a:solidFill>
+                        <a:schemeClr val="tx1"/>
+                      </a:solidFill>
+                      <a:prstDash val="solid"/>
+                      <a:round/>
+                      <a:headEnd type="none" w="med" len="med"/>
+                      <a:tailEnd type="none" w="med" len="med"/>
+                    </a:lnT>
+                    <a:lnB w="12700" cap="flat" cmpd="sng" algn="ctr">
+                      <a:solidFill>
+                        <a:schemeClr val="tx1"/>
+                      </a:solidFill>
+                      <a:prstDash val="solid"/>
+                      <a:round/>
+                      <a:headEnd type="none" w="med" len="med"/>
+                      <a:tailEnd type="none" w="med" len="med"/>
+                    </a:lnB>
+                    <a:lnTlToBr w="12700" cmpd="sng">
+                      <a:noFill/>
+                      <a:prstDash val="solid"/>
+                    </a:lnTlToBr>
+                    <a:lnBlToTr w="12700" cmpd="sng">
+                      <a:noFill/>
+                      <a:prstDash val="solid"/>
+                    </a:lnBlToTr>
+                  </a:tcPr>
+                </a:tc>
+                <a:extLst>
+                  <a:ext uri="{0D108BD9-81ED-4DB2-BD59-A6C34878D82A}">
+                    <a16:rowId xmlns:a16="http://schemas.microsoft.com/office/drawing/2014/main" val="2072067406"/>
+                  </a:ext>
+                </a:extLst>
+              </a:tr>
+              <a:tr h="1022982">
+                <a:tc>
+                  <a:txBody>
+                    <a:bodyPr/>
+                    <a:lstStyle/>
+                    <a:p>
+                      <a:r>
+                        <a:rPr lang="en-IN" dirty="0"/>
+                        <a:t>Storage, streams</a:t>
+                      </a:r>
+                    </a:p>
+                  </a:txBody>
+                  <a:tcPr anchor="ctr">
+                    <a:lnL w="12700" cap="flat" cmpd="sng" algn="ctr">
+                      <a:noFill/>
+                      <a:prstDash val="solid"/>
+                      <a:round/>
+                      <a:headEnd type="none" w="med" len="med"/>
+                      <a:tailEnd type="none" w="med" len="med"/>
+                    </a:lnL>
+                    <a:lnR w="12700" cap="flat" cmpd="sng" algn="ctr">
+                      <a:noFill/>
+                      <a:prstDash val="solid"/>
+                      <a:round/>
+                      <a:headEnd type="none" w="med" len="med"/>
+                      <a:tailEnd type="none" w="med" len="med"/>
+                    </a:lnR>
+                    <a:lnT w="12700" cap="flat" cmpd="sng" algn="ctr">
+                      <a:solidFill>
+                        <a:schemeClr val="tx1"/>
+                      </a:solidFill>
+                      <a:prstDash val="solid"/>
+                      <a:round/>
+                      <a:headEnd type="none" w="med" len="med"/>
+                      <a:tailEnd type="none" w="med" len="med"/>
+                    </a:lnT>
+                    <a:lnB w="12700" cap="flat" cmpd="sng" algn="ctr">
+                      <a:solidFill>
+                        <a:schemeClr val="tx1"/>
+                      </a:solidFill>
+                      <a:prstDash val="solid"/>
+                      <a:round/>
+                      <a:headEnd type="none" w="med" len="med"/>
+                      <a:tailEnd type="none" w="med" len="med"/>
+                    </a:lnB>
+                  </a:tcPr>
+                </a:tc>
+                <a:tc>
+                  <a:txBody>
+                    <a:bodyPr/>
+                    <a:lstStyle/>
+                    <a:p>
+                      <a:endParaRPr lang="en-IN" dirty="0"/>
+                    </a:p>
+                  </a:txBody>
+                  <a:tcPr>
+                    <a:lnL w="12700" cap="flat" cmpd="sng" algn="ctr">
+                      <a:noFill/>
+                      <a:prstDash val="solid"/>
+                      <a:round/>
+                      <a:headEnd type="none" w="med" len="med"/>
+                      <a:tailEnd type="none" w="med" len="med"/>
+                    </a:lnL>
+                    <a:lnR w="12700" cap="flat" cmpd="sng" algn="ctr">
+                      <a:noFill/>
+                      <a:prstDash val="solid"/>
+                      <a:round/>
+                      <a:headEnd type="none" w="med" len="med"/>
+                      <a:tailEnd type="none" w="med" len="med"/>
+                    </a:lnR>
+                    <a:lnT w="12700" cap="flat" cmpd="sng" algn="ctr">
+                      <a:solidFill>
+                        <a:schemeClr val="tx1"/>
+                      </a:solidFill>
+                      <a:prstDash val="solid"/>
+                      <a:round/>
+                      <a:headEnd type="none" w="med" len="med"/>
+                      <a:tailEnd type="none" w="med" len="med"/>
+                    </a:lnT>
+                    <a:lnB w="12700" cap="flat" cmpd="sng" algn="ctr">
+                      <a:solidFill>
+                        <a:schemeClr val="tx1"/>
+                      </a:solidFill>
+                      <a:prstDash val="solid"/>
+                      <a:round/>
+                      <a:headEnd type="none" w="med" len="med"/>
+                      <a:tailEnd type="none" w="med" len="med"/>
+                    </a:lnB>
+                    <a:lnTlToBr w="12700" cmpd="sng">
+                      <a:noFill/>
+                      <a:prstDash val="solid"/>
+                    </a:lnTlToBr>
+                    <a:lnBlToTr w="12700" cmpd="sng">
+                      <a:noFill/>
+                      <a:prstDash val="solid"/>
+                    </a:lnBlToTr>
+                  </a:tcPr>
+                </a:tc>
+                <a:extLst>
+                  <a:ext uri="{0D108BD9-81ED-4DB2-BD59-A6C34878D82A}">
+                    <a16:rowId xmlns:a16="http://schemas.microsoft.com/office/drawing/2014/main" val="1563180215"/>
+                  </a:ext>
+                </a:extLst>
+              </a:tr>
+            </a:tbl>
+          </a:graphicData>
+        </a:graphic>
+      </p:graphicFrame>
+      <p:sp>
+        <p:nvSpPr>
+          <p:cNvPr id="19" name="Rectangle: Rounded Corners 18">
+            <a:extLst>
+              <a:ext uri="{FF2B5EF4-FFF2-40B4-BE49-F238E27FC236}">
+                <a16:creationId xmlns:a16="http://schemas.microsoft.com/office/drawing/2014/main" id="{328747B4-E8CF-46A1-1EB0-CB4BE63C3F16}"/>
+              </a:ext>
+            </a:extLst>
+          </p:cNvPr>
+          <p:cNvSpPr/>
+          <p:nvPr/>
+        </p:nvSpPr>
+        <p:spPr>
+          <a:xfrm>
+            <a:off x="3333135" y="1927124"/>
+            <a:ext cx="1268362" cy="668594"/>
+          </a:xfrm>
+          <a:prstGeom prst="roundRect">
+            <a:avLst/>
+          </a:prstGeom>
+          <a:solidFill>
+            <a:srgbClr val="FF9D93"/>
+          </a:solidFill>
+        </p:spPr>
+        <p:style>
+          <a:lnRef idx="2">
+            <a:schemeClr val="accent1">
+              <a:shade val="15000"/>
+            </a:schemeClr>
+          </a:lnRef>
+          <a:fillRef idx="1">
+            <a:schemeClr val="accent1"/>
+          </a:fillRef>
+          <a:effectRef idx="0">
+            <a:schemeClr val="accent1"/>
+          </a:effectRef>
+          <a:fontRef idx="minor">
+            <a:schemeClr val="lt1"/>
+          </a:fontRef>
+        </p:style>
+        <p:txBody>
+          <a:bodyPr rtlCol="0" anchor="ctr"/>
+          <a:lstStyle/>
+          <a:p>
+            <a:pPr algn="ctr"/>
+            <a:r>
+              <a:rPr lang="en-IN" dirty="0"/>
+              <a:t>Hive</a:t>
+            </a:r>
+          </a:p>
+        </p:txBody>
+      </p:sp>
+      <p:sp>
+        <p:nvSpPr>
+          <p:cNvPr id="20" name="Rectangle: Rounded Corners 19">
+            <a:extLst>
+              <a:ext uri="{FF2B5EF4-FFF2-40B4-BE49-F238E27FC236}">
+                <a16:creationId xmlns:a16="http://schemas.microsoft.com/office/drawing/2014/main" id="{E6C0BDF4-311E-C422-E38B-5739BD132709}"/>
+              </a:ext>
+            </a:extLst>
+          </p:cNvPr>
+          <p:cNvSpPr/>
+          <p:nvPr/>
+        </p:nvSpPr>
+        <p:spPr>
+          <a:xfrm>
+            <a:off x="4933335" y="1927124"/>
+            <a:ext cx="1268362" cy="668594"/>
+          </a:xfrm>
+          <a:prstGeom prst="roundRect">
+            <a:avLst/>
+          </a:prstGeom>
+          <a:solidFill>
+            <a:srgbClr val="FF9D93"/>
+          </a:solidFill>
+        </p:spPr>
+        <p:style>
+          <a:lnRef idx="2">
+            <a:schemeClr val="accent1">
+              <a:shade val="15000"/>
+            </a:schemeClr>
+          </a:lnRef>
+          <a:fillRef idx="1">
+            <a:schemeClr val="accent1"/>
+          </a:fillRef>
+          <a:effectRef idx="0">
+            <a:schemeClr val="accent1"/>
+          </a:effectRef>
+          <a:fontRef idx="minor">
+            <a:schemeClr val="lt1"/>
+          </a:fontRef>
+        </p:style>
+        <p:txBody>
+          <a:bodyPr rtlCol="0" anchor="ctr"/>
+          <a:lstStyle/>
+          <a:p>
+            <a:pPr algn="ctr"/>
+            <a:r>
+              <a:rPr lang="en-IN" dirty="0"/>
+              <a:t>Mahout</a:t>
+            </a:r>
+          </a:p>
+        </p:txBody>
+      </p:sp>
+      <p:sp>
+        <p:nvSpPr>
+          <p:cNvPr id="23" name="Rectangle: Rounded Corners 22">
+            <a:extLst>
+              <a:ext uri="{FF2B5EF4-FFF2-40B4-BE49-F238E27FC236}">
+                <a16:creationId xmlns:a16="http://schemas.microsoft.com/office/drawing/2014/main" id="{BD9DE020-B857-894E-BD93-34235EA91565}"/>
+              </a:ext>
+            </a:extLst>
+          </p:cNvPr>
+          <p:cNvSpPr/>
+          <p:nvPr/>
+        </p:nvSpPr>
+        <p:spPr>
+          <a:xfrm>
+            <a:off x="6533535" y="1927124"/>
+            <a:ext cx="1268362" cy="668594"/>
+          </a:xfrm>
+          <a:prstGeom prst="roundRect">
+            <a:avLst/>
+          </a:prstGeom>
+          <a:solidFill>
+            <a:srgbClr val="FF9D93"/>
+          </a:solidFill>
+        </p:spPr>
+        <p:style>
+          <a:lnRef idx="2">
+            <a:schemeClr val="accent1">
+              <a:shade val="15000"/>
+            </a:schemeClr>
+          </a:lnRef>
+          <a:fillRef idx="1">
+            <a:schemeClr val="accent1"/>
+          </a:fillRef>
+          <a:effectRef idx="0">
+            <a:schemeClr val="accent1"/>
+          </a:effectRef>
+          <a:fontRef idx="minor">
+            <a:schemeClr val="lt1"/>
+          </a:fontRef>
+        </p:style>
+        <p:txBody>
+          <a:bodyPr rtlCol="0" anchor="ctr"/>
+          <a:lstStyle/>
+          <a:p>
+            <a:pPr algn="ctr"/>
+            <a:r>
+              <a:rPr lang="en-IN" dirty="0"/>
+              <a:t>Pig</a:t>
+            </a:r>
+          </a:p>
+        </p:txBody>
+      </p:sp>
+      <p:sp>
+        <p:nvSpPr>
+          <p:cNvPr id="24" name="Rectangle: Rounded Corners 23">
+            <a:extLst>
+              <a:ext uri="{FF2B5EF4-FFF2-40B4-BE49-F238E27FC236}">
+                <a16:creationId xmlns:a16="http://schemas.microsoft.com/office/drawing/2014/main" id="{384F9F41-A281-3974-5017-4A850278827A}"/>
+              </a:ext>
+            </a:extLst>
+          </p:cNvPr>
+          <p:cNvSpPr/>
+          <p:nvPr/>
+        </p:nvSpPr>
+        <p:spPr>
+          <a:xfrm>
+            <a:off x="8222225" y="1927124"/>
+            <a:ext cx="1268362" cy="668594"/>
+          </a:xfrm>
+          <a:prstGeom prst="roundRect">
+            <a:avLst/>
+          </a:prstGeom>
+          <a:solidFill>
+            <a:srgbClr val="FF9D93"/>
+          </a:solidFill>
+        </p:spPr>
+        <p:style>
+          <a:lnRef idx="2">
+            <a:schemeClr val="accent1">
+              <a:shade val="15000"/>
+            </a:schemeClr>
+          </a:lnRef>
+          <a:fillRef idx="1">
+            <a:schemeClr val="accent1"/>
+          </a:fillRef>
+          <a:effectRef idx="0">
+            <a:schemeClr val="accent1"/>
+          </a:effectRef>
+          <a:fontRef idx="minor">
+            <a:schemeClr val="lt1"/>
+          </a:fontRef>
+        </p:style>
+        <p:txBody>
+          <a:bodyPr rtlCol="0" anchor="ctr"/>
+          <a:lstStyle/>
+          <a:p>
+            <a:pPr algn="ctr"/>
+            <a:r>
+              <a:rPr lang="en-IN" dirty="0"/>
+              <a:t>Cascading</a:t>
+            </a:r>
+          </a:p>
+        </p:txBody>
+      </p:sp>
+      <p:sp>
+        <p:nvSpPr>
+          <p:cNvPr id="25" name="Rectangle: Rounded Corners 24">
+            <a:extLst>
+              <a:ext uri="{FF2B5EF4-FFF2-40B4-BE49-F238E27FC236}">
+                <a16:creationId xmlns:a16="http://schemas.microsoft.com/office/drawing/2014/main" id="{5F3AD091-4375-6EED-A609-E3BC1B07B2AB}"/>
+              </a:ext>
+            </a:extLst>
+          </p:cNvPr>
+          <p:cNvSpPr/>
+          <p:nvPr/>
+        </p:nvSpPr>
+        <p:spPr>
+          <a:xfrm>
+            <a:off x="3436374" y="5668297"/>
+            <a:ext cx="1268362" cy="668594"/>
+          </a:xfrm>
+          <a:prstGeom prst="roundRect">
+            <a:avLst/>
+          </a:prstGeom>
+        </p:spPr>
+        <p:style>
+          <a:lnRef idx="2">
+            <a:schemeClr val="accent1">
+              <a:shade val="15000"/>
+            </a:schemeClr>
+          </a:lnRef>
+          <a:fillRef idx="1">
+            <a:schemeClr val="accent1"/>
+          </a:fillRef>
+          <a:effectRef idx="0">
+            <a:schemeClr val="accent1"/>
+          </a:effectRef>
+          <a:fontRef idx="minor">
+            <a:schemeClr val="lt1"/>
+          </a:fontRef>
+        </p:style>
+        <p:txBody>
+          <a:bodyPr rtlCol="0" anchor="ctr"/>
+          <a:lstStyle/>
+          <a:p>
+            <a:pPr algn="ctr"/>
+            <a:r>
+              <a:rPr lang="en-IN" dirty="0"/>
+              <a:t>HDFS</a:t>
+            </a:r>
+          </a:p>
+        </p:txBody>
+      </p:sp>
+      <p:sp>
+        <p:nvSpPr>
+          <p:cNvPr id="26" name="Rectangle: Rounded Corners 25">
+            <a:extLst>
+              <a:ext uri="{FF2B5EF4-FFF2-40B4-BE49-F238E27FC236}">
+                <a16:creationId xmlns:a16="http://schemas.microsoft.com/office/drawing/2014/main" id="{58D2C8F6-4198-7E3F-95EF-5EF225EAEF5D}"/>
+              </a:ext>
+            </a:extLst>
+          </p:cNvPr>
+          <p:cNvSpPr/>
+          <p:nvPr/>
+        </p:nvSpPr>
+        <p:spPr>
+          <a:xfrm>
+            <a:off x="5176683" y="5673213"/>
+            <a:ext cx="1268362" cy="668594"/>
+          </a:xfrm>
+          <a:prstGeom prst="roundRect">
+            <a:avLst/>
+          </a:prstGeom>
+        </p:spPr>
+        <p:style>
+          <a:lnRef idx="2">
+            <a:schemeClr val="accent1">
+              <a:shade val="15000"/>
+            </a:schemeClr>
+          </a:lnRef>
+          <a:fillRef idx="1">
+            <a:schemeClr val="accent1"/>
+          </a:fillRef>
+          <a:effectRef idx="0">
+            <a:schemeClr val="accent1"/>
+          </a:effectRef>
+          <a:fontRef idx="minor">
+            <a:schemeClr val="lt1"/>
+          </a:fontRef>
+        </p:style>
+        <p:txBody>
+          <a:bodyPr rtlCol="0" anchor="ctr"/>
+          <a:lstStyle/>
+          <a:p>
+            <a:pPr algn="ctr"/>
+            <a:r>
+              <a:rPr lang="en-IN" dirty="0"/>
+              <a:t>HBASE</a:t>
+            </a:r>
+          </a:p>
+        </p:txBody>
+      </p:sp>
+      <p:sp>
+        <p:nvSpPr>
+          <p:cNvPr id="27" name="Rectangle: Rounded Corners 26">
+            <a:extLst>
+              <a:ext uri="{FF2B5EF4-FFF2-40B4-BE49-F238E27FC236}">
+                <a16:creationId xmlns:a16="http://schemas.microsoft.com/office/drawing/2014/main" id="{D5BD5D03-F70E-E3A1-EDB1-B42AAD35E433}"/>
+              </a:ext>
+            </a:extLst>
+          </p:cNvPr>
+          <p:cNvSpPr/>
+          <p:nvPr/>
+        </p:nvSpPr>
+        <p:spPr>
+          <a:xfrm>
+            <a:off x="6914535" y="5668297"/>
+            <a:ext cx="1268362" cy="668594"/>
+          </a:xfrm>
+          <a:prstGeom prst="roundRect">
+            <a:avLst/>
+          </a:prstGeom>
+        </p:spPr>
+        <p:style>
+          <a:lnRef idx="2">
+            <a:schemeClr val="accent1">
+              <a:shade val="15000"/>
+            </a:schemeClr>
+          </a:lnRef>
+          <a:fillRef idx="1">
+            <a:schemeClr val="accent1"/>
+          </a:fillRef>
+          <a:effectRef idx="0">
+            <a:schemeClr val="accent1"/>
+          </a:effectRef>
+          <a:fontRef idx="minor">
+            <a:schemeClr val="lt1"/>
+          </a:fontRef>
+        </p:style>
+        <p:txBody>
+          <a:bodyPr rtlCol="0" anchor="ctr"/>
+          <a:lstStyle/>
+          <a:p>
+            <a:pPr algn="ctr"/>
+            <a:r>
+              <a:rPr lang="en-IN" dirty="0"/>
+              <a:t>Kafka</a:t>
+            </a:r>
+          </a:p>
+        </p:txBody>
+      </p:sp>
+      <p:sp>
+        <p:nvSpPr>
+          <p:cNvPr id="28" name="Rectangle: Rounded Corners 27">
+            <a:extLst>
+              <a:ext uri="{FF2B5EF4-FFF2-40B4-BE49-F238E27FC236}">
+                <a16:creationId xmlns:a16="http://schemas.microsoft.com/office/drawing/2014/main" id="{40432569-BA46-BC77-B1F1-CB70A5F0E122}"/>
+              </a:ext>
+            </a:extLst>
+          </p:cNvPr>
+          <p:cNvSpPr/>
+          <p:nvPr/>
+        </p:nvSpPr>
+        <p:spPr>
+          <a:xfrm>
+            <a:off x="3436374" y="4778050"/>
+            <a:ext cx="1268362" cy="668594"/>
+          </a:xfrm>
+          <a:prstGeom prst="roundRect">
+            <a:avLst/>
+          </a:prstGeom>
+          <a:solidFill>
+            <a:schemeClr val="accent6">
+              <a:lumMod val="75000"/>
+            </a:schemeClr>
+          </a:solidFill>
+        </p:spPr>
+        <p:style>
+          <a:lnRef idx="2">
+            <a:schemeClr val="accent1">
+              <a:shade val="15000"/>
+            </a:schemeClr>
+          </a:lnRef>
+          <a:fillRef idx="1">
+            <a:schemeClr val="accent1"/>
+          </a:fillRef>
+          <a:effectRef idx="0">
+            <a:schemeClr val="accent1"/>
+          </a:effectRef>
+          <a:fontRef idx="minor">
+            <a:schemeClr val="lt1"/>
+          </a:fontRef>
+        </p:style>
+        <p:txBody>
+          <a:bodyPr rtlCol="0" anchor="ctr"/>
+          <a:lstStyle/>
+          <a:p>
+            <a:pPr algn="ctr"/>
+            <a:r>
+              <a:rPr lang="en-IN" dirty="0"/>
+              <a:t>YARN</a:t>
+            </a:r>
+          </a:p>
+        </p:txBody>
+      </p:sp>
+      <p:sp>
+        <p:nvSpPr>
+          <p:cNvPr id="29" name="Rectangle: Rounded Corners 28">
+            <a:extLst>
+              <a:ext uri="{FF2B5EF4-FFF2-40B4-BE49-F238E27FC236}">
+                <a16:creationId xmlns:a16="http://schemas.microsoft.com/office/drawing/2014/main" id="{F690DCA7-11C8-303A-7EF6-CA46F72FD717}"/>
+              </a:ext>
+            </a:extLst>
+          </p:cNvPr>
+          <p:cNvSpPr/>
+          <p:nvPr/>
+        </p:nvSpPr>
+        <p:spPr>
+          <a:xfrm>
+            <a:off x="5176683" y="4778050"/>
+            <a:ext cx="1268362" cy="668594"/>
+          </a:xfrm>
+          <a:prstGeom prst="roundRect">
+            <a:avLst/>
+          </a:prstGeom>
+          <a:solidFill>
+            <a:schemeClr val="accent6">
+              <a:lumMod val="75000"/>
+            </a:schemeClr>
+          </a:solidFill>
+        </p:spPr>
+        <p:style>
+          <a:lnRef idx="2">
+            <a:schemeClr val="accent1">
+              <a:shade val="15000"/>
+            </a:schemeClr>
+          </a:lnRef>
+          <a:fillRef idx="1">
+            <a:schemeClr val="accent1"/>
+          </a:fillRef>
+          <a:effectRef idx="0">
+            <a:schemeClr val="accent1"/>
+          </a:effectRef>
+          <a:fontRef idx="minor">
+            <a:schemeClr val="lt1"/>
+          </a:fontRef>
+        </p:style>
+        <p:txBody>
+          <a:bodyPr rtlCol="0" anchor="ctr"/>
+          <a:lstStyle/>
+          <a:p>
+            <a:pPr algn="ctr"/>
+            <a:r>
+              <a:rPr lang="en-IN" dirty="0"/>
+              <a:t>MESOS</a:t>
+            </a:r>
+          </a:p>
+        </p:txBody>
+      </p:sp>
+      <p:grpSp>
+        <p:nvGrpSpPr>
+          <p:cNvPr id="53" name="Group 52">
+            <a:extLst>
+              <a:ext uri="{FF2B5EF4-FFF2-40B4-BE49-F238E27FC236}">
+                <a16:creationId xmlns:a16="http://schemas.microsoft.com/office/drawing/2014/main" id="{4FEDA3E1-EC81-3E50-4880-A6AE0A57D4B1}"/>
+              </a:ext>
+            </a:extLst>
+          </p:cNvPr>
+          <p:cNvGrpSpPr/>
+          <p:nvPr/>
+        </p:nvGrpSpPr>
+        <p:grpSpPr>
+          <a:xfrm>
+            <a:off x="3465870" y="2892680"/>
+            <a:ext cx="2158181" cy="668594"/>
+            <a:chOff x="3465870" y="2892680"/>
+            <a:chExt cx="2158181" cy="668594"/>
+          </a:xfrm>
+        </p:grpSpPr>
+        <p:sp>
+          <p:nvSpPr>
+            <p:cNvPr id="32" name="Rectangle: Rounded Corners 31">
+              <a:extLst>
+                <a:ext uri="{FF2B5EF4-FFF2-40B4-BE49-F238E27FC236}">
+                  <a16:creationId xmlns:a16="http://schemas.microsoft.com/office/drawing/2014/main" id="{BFCFD76F-FC81-D241-C59A-2D3E8DD0C882}"/>
+                </a:ext>
+              </a:extLst>
+            </p:cNvPr>
+            <p:cNvSpPr/>
+            <p:nvPr/>
+          </p:nvSpPr>
+          <p:spPr>
+            <a:xfrm>
+              <a:off x="3465870" y="2892680"/>
+              <a:ext cx="2158181" cy="668594"/>
+            </a:xfrm>
+            <a:prstGeom prst="roundRect">
+              <a:avLst/>
+            </a:prstGeom>
+            <a:solidFill>
+              <a:srgbClr val="92D050"/>
+            </a:solidFill>
+          </p:spPr>
+          <p:style>
+            <a:lnRef idx="2">
+              <a:schemeClr val="accent1">
+                <a:shade val="15000"/>
+              </a:schemeClr>
+            </a:lnRef>
+            <a:fillRef idx="1">
+              <a:schemeClr val="accent1"/>
+            </a:fillRef>
+            <a:effectRef idx="0">
+              <a:schemeClr val="accent1"/>
+            </a:effectRef>
+            <a:fontRef idx="minor">
+              <a:schemeClr val="lt1"/>
+            </a:fontRef>
+          </p:style>
+          <p:txBody>
+            <a:bodyPr rtlCol="0" anchor="ctr"/>
+            <a:lstStyle/>
+            <a:p>
+              <a:r>
+                <a:rPr lang="en-IN" dirty="0"/>
+                <a:t>Map Reduce </a:t>
+              </a:r>
+            </a:p>
+          </p:txBody>
+        </p:sp>
+        <p:pic>
+          <p:nvPicPr>
+            <p:cNvPr id="34" name="Picture 33">
+              <a:extLst>
+                <a:ext uri="{FF2B5EF4-FFF2-40B4-BE49-F238E27FC236}">
+                  <a16:creationId xmlns:a16="http://schemas.microsoft.com/office/drawing/2014/main" id="{355B3843-4F2F-5DFB-ECA1-633C1C3B313E}"/>
+                </a:ext>
+              </a:extLst>
+            </p:cNvPr>
+            <p:cNvPicPr>
+              <a:picLocks noChangeAspect="1"/>
+            </p:cNvPicPr>
+            <p:nvPr/>
+          </p:nvPicPr>
+          <p:blipFill>
+            <a:blip r:embed="rId2"/>
+            <a:stretch>
+              <a:fillRect/>
+            </a:stretch>
+          </p:blipFill>
+          <p:spPr>
+            <a:xfrm>
+              <a:off x="4887256" y="2963553"/>
+              <a:ext cx="736795" cy="526848"/>
+            </a:xfrm>
+            <a:prstGeom prst="rect">
+              <a:avLst/>
+            </a:prstGeom>
+          </p:spPr>
+        </p:pic>
+      </p:grpSp>
+      <p:grpSp>
+        <p:nvGrpSpPr>
+          <p:cNvPr id="52" name="Group 51">
+            <a:extLst>
+              <a:ext uri="{FF2B5EF4-FFF2-40B4-BE49-F238E27FC236}">
+                <a16:creationId xmlns:a16="http://schemas.microsoft.com/office/drawing/2014/main" id="{748E6C6F-E2D7-AE41-2FF0-0830F50F11EA}"/>
+              </a:ext>
+            </a:extLst>
+          </p:cNvPr>
+          <p:cNvGrpSpPr/>
+          <p:nvPr/>
+        </p:nvGrpSpPr>
+        <p:grpSpPr>
+          <a:xfrm>
+            <a:off x="8501234" y="2861656"/>
+            <a:ext cx="1398639" cy="668594"/>
+            <a:chOff x="8222225" y="2892680"/>
+            <a:chExt cx="1398639" cy="668594"/>
+          </a:xfrm>
+        </p:grpSpPr>
+        <p:sp>
+          <p:nvSpPr>
+            <p:cNvPr id="37" name="Rectangle: Rounded Corners 36">
+              <a:extLst>
+                <a:ext uri="{FF2B5EF4-FFF2-40B4-BE49-F238E27FC236}">
+                  <a16:creationId xmlns:a16="http://schemas.microsoft.com/office/drawing/2014/main" id="{A2EFE67E-CF7A-2FEC-461F-D84918985D35}"/>
+                </a:ext>
+              </a:extLst>
+            </p:cNvPr>
+            <p:cNvSpPr/>
+            <p:nvPr/>
+          </p:nvSpPr>
+          <p:spPr>
+            <a:xfrm>
+              <a:off x="8222225" y="2892680"/>
+              <a:ext cx="1398639" cy="668594"/>
+            </a:xfrm>
+            <a:prstGeom prst="roundRect">
+              <a:avLst/>
+            </a:prstGeom>
+            <a:solidFill>
+              <a:srgbClr val="92D050"/>
+            </a:solidFill>
+          </p:spPr>
+          <p:style>
+            <a:lnRef idx="2">
+              <a:schemeClr val="accent1">
+                <a:shade val="15000"/>
+              </a:schemeClr>
+            </a:lnRef>
+            <a:fillRef idx="1">
+              <a:schemeClr val="accent1"/>
+            </a:fillRef>
+            <a:effectRef idx="0">
+              <a:schemeClr val="accent1"/>
+            </a:effectRef>
+            <a:fontRef idx="minor">
+              <a:schemeClr val="lt1"/>
+            </a:fontRef>
+          </p:style>
+          <p:txBody>
+            <a:bodyPr rtlCol="0" anchor="ctr"/>
+            <a:lstStyle/>
+            <a:p>
+              <a:r>
+                <a:rPr lang="en-IN" dirty="0" err="1"/>
+                <a:t>Flink</a:t>
+              </a:r>
+              <a:endParaRPr lang="en-IN" dirty="0"/>
+            </a:p>
+          </p:txBody>
+        </p:sp>
+        <p:pic>
+          <p:nvPicPr>
+            <p:cNvPr id="39" name="Picture 38">
+              <a:extLst>
+                <a:ext uri="{FF2B5EF4-FFF2-40B4-BE49-F238E27FC236}">
+                  <a16:creationId xmlns:a16="http://schemas.microsoft.com/office/drawing/2014/main" id="{6A1E0FBC-BEBA-F244-7943-ECCE004F831A}"/>
+                </a:ext>
+              </a:extLst>
+            </p:cNvPr>
+            <p:cNvPicPr>
+              <a:picLocks noChangeAspect="1"/>
+            </p:cNvPicPr>
+            <p:nvPr/>
+          </p:nvPicPr>
+          <p:blipFill>
+            <a:blip r:embed="rId3"/>
+            <a:stretch>
+              <a:fillRect/>
+            </a:stretch>
+          </p:blipFill>
+          <p:spPr>
+            <a:xfrm>
+              <a:off x="8982304" y="2936053"/>
+              <a:ext cx="557443" cy="553188"/>
+            </a:xfrm>
+            <a:prstGeom prst="rect">
+              <a:avLst/>
+            </a:prstGeom>
+          </p:spPr>
+        </p:pic>
+      </p:grpSp>
+      <p:grpSp>
+        <p:nvGrpSpPr>
+          <p:cNvPr id="48" name="Group 47">
+            <a:extLst>
+              <a:ext uri="{FF2B5EF4-FFF2-40B4-BE49-F238E27FC236}">
+                <a16:creationId xmlns:a16="http://schemas.microsoft.com/office/drawing/2014/main" id="{3710D9A8-BAEE-D679-72C0-4C7C49AB800F}"/>
+              </a:ext>
+            </a:extLst>
+          </p:cNvPr>
+          <p:cNvGrpSpPr/>
+          <p:nvPr/>
+        </p:nvGrpSpPr>
+        <p:grpSpPr>
+          <a:xfrm>
+            <a:off x="4106821" y="3780096"/>
+            <a:ext cx="1560870" cy="668594"/>
+            <a:chOff x="4601498" y="3712054"/>
+            <a:chExt cx="1560870" cy="668594"/>
+          </a:xfrm>
+        </p:grpSpPr>
+        <p:sp>
+          <p:nvSpPr>
+            <p:cNvPr id="41" name="Rectangle: Rounded Corners 40">
+              <a:extLst>
+                <a:ext uri="{FF2B5EF4-FFF2-40B4-BE49-F238E27FC236}">
+                  <a16:creationId xmlns:a16="http://schemas.microsoft.com/office/drawing/2014/main" id="{D65E68DD-8026-F213-21D0-9DE2406689BD}"/>
+                </a:ext>
+              </a:extLst>
+            </p:cNvPr>
+            <p:cNvSpPr/>
+            <p:nvPr/>
+          </p:nvSpPr>
+          <p:spPr>
+            <a:xfrm>
+              <a:off x="4601498" y="3712054"/>
+              <a:ext cx="1560870" cy="668594"/>
+            </a:xfrm>
+            <a:prstGeom prst="roundRect">
+              <a:avLst/>
+            </a:prstGeom>
+            <a:solidFill>
+              <a:srgbClr val="92D050"/>
+            </a:solidFill>
+          </p:spPr>
+          <p:style>
+            <a:lnRef idx="2">
+              <a:schemeClr val="accent1">
+                <a:shade val="15000"/>
+              </a:schemeClr>
+            </a:lnRef>
+            <a:fillRef idx="1">
+              <a:schemeClr val="accent1"/>
+            </a:fillRef>
+            <a:effectRef idx="0">
+              <a:schemeClr val="accent1"/>
+            </a:effectRef>
+            <a:fontRef idx="minor">
+              <a:schemeClr val="lt1"/>
+            </a:fontRef>
+          </p:style>
+          <p:txBody>
+            <a:bodyPr rtlCol="0" anchor="ctr"/>
+            <a:lstStyle/>
+            <a:p>
+              <a:r>
+                <a:rPr lang="en-IN" dirty="0"/>
+                <a:t>Spark</a:t>
+              </a:r>
+            </a:p>
+          </p:txBody>
+        </p:sp>
+        <p:pic>
+          <p:nvPicPr>
+            <p:cNvPr id="45" name="Picture 44">
+              <a:extLst>
+                <a:ext uri="{FF2B5EF4-FFF2-40B4-BE49-F238E27FC236}">
+                  <a16:creationId xmlns:a16="http://schemas.microsoft.com/office/drawing/2014/main" id="{832E196B-937F-B6B2-AB85-B85D8968F06F}"/>
+                </a:ext>
+              </a:extLst>
+            </p:cNvPr>
+            <p:cNvPicPr>
+              <a:picLocks noChangeAspect="1"/>
+            </p:cNvPicPr>
+            <p:nvPr/>
+          </p:nvPicPr>
+          <p:blipFill>
+            <a:blip r:embed="rId4"/>
+            <a:stretch>
+              <a:fillRect/>
+            </a:stretch>
+          </p:blipFill>
+          <p:spPr>
+            <a:xfrm>
+              <a:off x="5351708" y="3839169"/>
+              <a:ext cx="810659" cy="418199"/>
+            </a:xfrm>
+            <a:prstGeom prst="rect">
+              <a:avLst/>
+            </a:prstGeom>
+          </p:spPr>
+        </p:pic>
+      </p:grpSp>
+      <p:grpSp>
+        <p:nvGrpSpPr>
+          <p:cNvPr id="54" name="Group 53">
+            <a:extLst>
+              <a:ext uri="{FF2B5EF4-FFF2-40B4-BE49-F238E27FC236}">
+                <a16:creationId xmlns:a16="http://schemas.microsoft.com/office/drawing/2014/main" id="{E4338DCA-9D0E-D1A5-AEA4-74E569DBE998}"/>
+              </a:ext>
+            </a:extLst>
+          </p:cNvPr>
+          <p:cNvGrpSpPr/>
+          <p:nvPr/>
+        </p:nvGrpSpPr>
+        <p:grpSpPr>
+          <a:xfrm>
+            <a:off x="6204155" y="2899489"/>
+            <a:ext cx="1538713" cy="668594"/>
+            <a:chOff x="6213987" y="2948650"/>
+            <a:chExt cx="1538713" cy="668594"/>
+          </a:xfrm>
+        </p:grpSpPr>
+        <p:sp>
+          <p:nvSpPr>
+            <p:cNvPr id="43" name="Rectangle: Rounded Corners 42">
+              <a:extLst>
+                <a:ext uri="{FF2B5EF4-FFF2-40B4-BE49-F238E27FC236}">
+                  <a16:creationId xmlns:a16="http://schemas.microsoft.com/office/drawing/2014/main" id="{31BB72F9-3A29-C1FB-DF79-AF012DF0D1C7}"/>
+                </a:ext>
+              </a:extLst>
+            </p:cNvPr>
+            <p:cNvSpPr/>
+            <p:nvPr/>
+          </p:nvSpPr>
+          <p:spPr>
+            <a:xfrm>
+              <a:off x="6213987" y="2948650"/>
+              <a:ext cx="1538713" cy="668594"/>
+            </a:xfrm>
+            <a:prstGeom prst="roundRect">
+              <a:avLst/>
+            </a:prstGeom>
+            <a:solidFill>
+              <a:srgbClr val="92D050"/>
+            </a:solidFill>
+          </p:spPr>
+          <p:style>
+            <a:lnRef idx="2">
+              <a:schemeClr val="accent1">
+                <a:shade val="15000"/>
+              </a:schemeClr>
+            </a:lnRef>
+            <a:fillRef idx="1">
+              <a:schemeClr val="accent1"/>
+            </a:fillRef>
+            <a:effectRef idx="0">
+              <a:schemeClr val="accent1"/>
+            </a:effectRef>
+            <a:fontRef idx="minor">
+              <a:schemeClr val="lt1"/>
+            </a:fontRef>
+          </p:style>
+          <p:txBody>
+            <a:bodyPr rtlCol="0" anchor="ctr"/>
+            <a:lstStyle/>
+            <a:p>
+              <a:r>
+                <a:rPr lang="en-IN" dirty="0"/>
+                <a:t>Storm</a:t>
+              </a:r>
+            </a:p>
+          </p:txBody>
+        </p:sp>
+        <p:pic>
+          <p:nvPicPr>
+            <p:cNvPr id="47" name="Picture 46">
+              <a:extLst>
+                <a:ext uri="{FF2B5EF4-FFF2-40B4-BE49-F238E27FC236}">
+                  <a16:creationId xmlns:a16="http://schemas.microsoft.com/office/drawing/2014/main" id="{3E1C11E1-6B57-296F-FD55-BD2E5B7B7D1F}"/>
+                </a:ext>
+              </a:extLst>
+            </p:cNvPr>
+            <p:cNvPicPr>
+              <a:picLocks noChangeAspect="1"/>
+            </p:cNvPicPr>
+            <p:nvPr/>
+          </p:nvPicPr>
+          <p:blipFill>
+            <a:blip r:embed="rId5"/>
+            <a:stretch>
+              <a:fillRect/>
+            </a:stretch>
+          </p:blipFill>
+          <p:spPr>
+            <a:xfrm>
+              <a:off x="7056463" y="3011007"/>
+              <a:ext cx="612127" cy="568404"/>
+            </a:xfrm>
+            <a:prstGeom prst="rect">
+              <a:avLst/>
+            </a:prstGeom>
+          </p:spPr>
+        </p:pic>
+      </p:grpSp>
+      <p:grpSp>
+        <p:nvGrpSpPr>
+          <p:cNvPr id="51" name="Group 50">
+            <a:extLst>
+              <a:ext uri="{FF2B5EF4-FFF2-40B4-BE49-F238E27FC236}">
+                <a16:creationId xmlns:a16="http://schemas.microsoft.com/office/drawing/2014/main" id="{738C75D7-0641-1EB1-7D15-A96F6ED2222E}"/>
+              </a:ext>
+            </a:extLst>
+          </p:cNvPr>
+          <p:cNvGrpSpPr/>
+          <p:nvPr/>
+        </p:nvGrpSpPr>
+        <p:grpSpPr>
+          <a:xfrm>
+            <a:off x="6887212" y="3862238"/>
+            <a:ext cx="1172497" cy="668594"/>
+            <a:chOff x="8534400" y="3887283"/>
+            <a:chExt cx="1172497" cy="668594"/>
+          </a:xfrm>
+        </p:grpSpPr>
+        <p:sp>
+          <p:nvSpPr>
+            <p:cNvPr id="42" name="Rectangle: Rounded Corners 41">
+              <a:extLst>
+                <a:ext uri="{FF2B5EF4-FFF2-40B4-BE49-F238E27FC236}">
+                  <a16:creationId xmlns:a16="http://schemas.microsoft.com/office/drawing/2014/main" id="{6DAE0FF2-6E8A-0F49-101D-E09615C5274D}"/>
+                </a:ext>
+              </a:extLst>
+            </p:cNvPr>
+            <p:cNvSpPr/>
+            <p:nvPr/>
+          </p:nvSpPr>
+          <p:spPr>
+            <a:xfrm>
+              <a:off x="8534400" y="3887283"/>
+              <a:ext cx="1172497" cy="668594"/>
+            </a:xfrm>
+            <a:prstGeom prst="roundRect">
+              <a:avLst/>
+            </a:prstGeom>
+            <a:solidFill>
+              <a:srgbClr val="92D050"/>
+            </a:solidFill>
+          </p:spPr>
+          <p:style>
+            <a:lnRef idx="2">
+              <a:schemeClr val="accent1">
+                <a:shade val="15000"/>
+              </a:schemeClr>
+            </a:lnRef>
+            <a:fillRef idx="1">
+              <a:schemeClr val="accent1"/>
+            </a:fillRef>
+            <a:effectRef idx="0">
+              <a:schemeClr val="accent1"/>
+            </a:effectRef>
+            <a:fontRef idx="minor">
+              <a:schemeClr val="lt1"/>
+            </a:fontRef>
+          </p:style>
+          <p:txBody>
+            <a:bodyPr rtlCol="0" anchor="ctr"/>
+            <a:lstStyle/>
+            <a:p>
+              <a:r>
+                <a:rPr lang="en-IN" dirty="0"/>
+                <a:t>Tez</a:t>
+              </a:r>
+            </a:p>
+          </p:txBody>
+        </p:sp>
+        <p:pic>
+          <p:nvPicPr>
+            <p:cNvPr id="50" name="Picture 49">
+              <a:extLst>
+                <a:ext uri="{FF2B5EF4-FFF2-40B4-BE49-F238E27FC236}">
+                  <a16:creationId xmlns:a16="http://schemas.microsoft.com/office/drawing/2014/main" id="{12C29F82-BA05-0746-9F2D-4243256236E1}"/>
+                </a:ext>
+              </a:extLst>
+            </p:cNvPr>
+            <p:cNvPicPr>
+              <a:picLocks noChangeAspect="1"/>
+            </p:cNvPicPr>
+            <p:nvPr/>
+          </p:nvPicPr>
+          <p:blipFill>
+            <a:blip r:embed="rId6"/>
+            <a:stretch>
+              <a:fillRect/>
+            </a:stretch>
+          </p:blipFill>
+          <p:spPr>
+            <a:xfrm>
+              <a:off x="9128413" y="3995890"/>
+              <a:ext cx="467174" cy="467174"/>
+            </a:xfrm>
+            <a:prstGeom prst="rect">
+              <a:avLst/>
+            </a:prstGeom>
+          </p:spPr>
+        </p:pic>
+      </p:grpSp>
+    </p:spTree>
+    <p:extLst>
+      <p:ext uri="{BB962C8B-B14F-4D97-AF65-F5344CB8AC3E}">
+        <p14:creationId xmlns:p14="http://schemas.microsoft.com/office/powerpoint/2010/main" val="2254659191"/>
+      </p:ext>
+    </p:extLst>
+  </p:cSld>
+  <p:clrMapOvr>
+    <a:masterClrMapping/>
+  </p:clrMapOvr>
+</p:sld>
+</file>
+
+<file path=ppt/slides/slide5.xml><?xml version="1.0" encoding="utf-8"?>
+<p:sld xmlns:a="http://schemas.openxmlformats.org/drawingml/2006/main" xmlns:r="http://schemas.openxmlformats.org/officeDocument/2006/relationships" xmlns:p="http://schemas.openxmlformats.org/presentationml/2006/main">
+  <p:cSld>
+    <p:spTree>
+      <p:nvGrpSpPr>
+        <p:cNvPr id="1" name=""/>
+        <p:cNvGrpSpPr/>
+        <p:nvPr/>
+      </p:nvGrpSpPr>
+      <p:grpSpPr>
+        <a:xfrm>
+          <a:off x="0" y="0"/>
+          <a:ext cx="0" cy="0"/>
+          <a:chOff x="0" y="0"/>
+          <a:chExt cx="0" cy="0"/>
+        </a:xfrm>
+      </p:grpSpPr>
+    </p:spTree>
+    <p:extLst>
+      <p:ext uri="{BB962C8B-B14F-4D97-AF65-F5344CB8AC3E}">
+        <p14:creationId xmlns:p14="http://schemas.microsoft.com/office/powerpoint/2010/main" val="57911494"/>
+      </p:ext>
+    </p:extLst>
+  </p:cSld>
+  <p:clrMapOvr>
+    <a:masterClrMapping/>
+  </p:clrMapOvr>
+</p:sld>
+</file>
+
+<file path=ppt/slides/slide6.xml><?xml version="1.0" encoding="utf-8"?>
 <p:sld xmlns:a="http://schemas.openxmlformats.org/drawingml/2006/main" xmlns:r="http://schemas.openxmlformats.org/officeDocument/2006/relationships" xmlns:p="http://schemas.openxmlformats.org/presentationml/2006/main">
   <p:cSld>
     <p:bg>
@@ -11056,7 +12996,7 @@
 </p:sld>
 </file>
 
-<file path=ppt/slides/slide3.xml><?xml version="1.0" encoding="utf-8"?>
+<file path=ppt/slides/slide7.xml><?xml version="1.0" encoding="utf-8"?>
 <p:sld xmlns:a="http://schemas.openxmlformats.org/drawingml/2006/main" xmlns:r="http://schemas.openxmlformats.org/officeDocument/2006/relationships" xmlns:p="http://schemas.openxmlformats.org/presentationml/2006/main">
   <p:cSld>
     <p:spTree>
@@ -11166,7 +13106,7 @@
 </p:sld>
 </file>
 
-<file path=ppt/slides/slide4.xml><?xml version="1.0" encoding="utf-8"?>
+<file path=ppt/slides/slide8.xml><?xml version="1.0" encoding="utf-8"?>
 <p:sld xmlns:a="http://schemas.openxmlformats.org/drawingml/2006/main" xmlns:r="http://schemas.openxmlformats.org/officeDocument/2006/relationships" xmlns:p="http://schemas.openxmlformats.org/presentationml/2006/main">
   <p:cSld>
     <p:spTree>

</xml_diff>